<commit_message>
Presentation that was held
</commit_message>
<xml_diff>
--- a/docs/MidTermSE.pptx
+++ b/docs/MidTermSE.pptx
@@ -5,7 +5,7 @@
     <p:sldMasterId id="2147483667" r:id="rId1"/>
   </p:sldMasterIdLst>
   <p:notesMasterIdLst>
-    <p:notesMasterId r:id="rId15"/>
+    <p:notesMasterId r:id="rId16"/>
   </p:notesMasterIdLst>
   <p:sldIdLst>
     <p:sldId id="256" r:id="rId2"/>
@@ -21,6 +21,7 @@
     <p:sldId id="266" r:id="rId12"/>
     <p:sldId id="263" r:id="rId13"/>
     <p:sldId id="262" r:id="rId14"/>
+    <p:sldId id="270" r:id="rId15"/>
   </p:sldIdLst>
   <p:sldSz cx="9144000" cy="6858000" type="screen4x3"/>
   <p:notesSz cx="6858000" cy="9144000"/>
@@ -209,7 +210,7 @@
           <a:p>
             <a:fld id="{FF8B4F5F-56C7-4005-BD2F-639DDA123AAA}" type="datetimeFigureOut">
               <a:rPr lang="en-GB" smtClean="0"/>
-              <a:t>11/12/2016</a:t>
+              <a:t>14/12/2016</a:t>
             </a:fld>
             <a:endParaRPr lang="en-GB"/>
           </a:p>
@@ -1415,7 +1416,7 @@
             <a:fld id="{08B9EBBA-996F-894A-B54A-D6246ED52CEA}" type="datetimeFigureOut">
               <a:rPr lang="en-US" smtClean="0"/>
               <a:pPr/>
-              <a:t>12/11/2016</a:t>
+              <a:t>12/14/2016</a:t>
             </a:fld>
             <a:endParaRPr lang="en-US" dirty="0"/>
           </a:p>
@@ -1735,7 +1736,7 @@
             <a:fld id="{18C79C5D-2A6F-F04D-97DA-BEF2467B64E4}" type="datetimeFigureOut">
               <a:rPr lang="en-US" smtClean="0"/>
               <a:pPr/>
-              <a:t>12/11/2016</a:t>
+              <a:t>12/14/2016</a:t>
             </a:fld>
             <a:endParaRPr lang="en-US" dirty="0"/>
           </a:p>
@@ -2225,7 +2226,7 @@
             <a:fld id="{8DFA1846-DA80-1C48-A609-854EA85C59AD}" type="datetimeFigureOut">
               <a:rPr lang="en-US" smtClean="0"/>
               <a:pPr/>
-              <a:t>12/11/2016</a:t>
+              <a:t>12/14/2016</a:t>
             </a:fld>
             <a:endParaRPr lang="en-US" dirty="0"/>
           </a:p>
@@ -2596,7 +2597,7 @@
             <a:fld id="{FBF54567-0DE4-3F47-BF90-CB84690072F9}" type="datetimeFigureOut">
               <a:rPr lang="en-US" smtClean="0"/>
               <a:pPr/>
-              <a:t>12/11/2016</a:t>
+              <a:t>12/14/2016</a:t>
             </a:fld>
             <a:endParaRPr lang="en-US" dirty="0"/>
           </a:p>
@@ -2871,7 +2872,7 @@
             <a:fld id="{C6C52C72-DE31-F449-A4ED-4C594FD91407}" type="datetimeFigureOut">
               <a:rPr lang="en-US" smtClean="0"/>
               <a:pPr/>
-              <a:t>12/11/2016</a:t>
+              <a:t>12/14/2016</a:t>
             </a:fld>
             <a:endParaRPr lang="en-US" dirty="0"/>
           </a:p>
@@ -3199,7 +3200,7 @@
             <a:fld id="{ED62726E-379B-B349-9EED-81ED093FA806}" type="datetimeFigureOut">
               <a:rPr lang="en-US" smtClean="0"/>
               <a:pPr/>
-              <a:t>12/11/2016</a:t>
+              <a:t>12/14/2016</a:t>
             </a:fld>
             <a:endParaRPr lang="en-US" dirty="0"/>
           </a:p>
@@ -3479,7 +3480,7 @@
             <a:fld id="{9B3A1323-8D79-1946-B0D7-40001CF92E9D}" type="datetimeFigureOut">
               <a:rPr lang="en-US" smtClean="0"/>
               <a:pPr/>
-              <a:t>12/11/2016</a:t>
+              <a:t>12/14/2016</a:t>
             </a:fld>
             <a:endParaRPr lang="en-US" dirty="0"/>
           </a:p>
@@ -3824,7 +3825,7 @@
             <a:fld id="{8DFA1846-DA80-1C48-A609-854EA85C59AD}" type="datetimeFigureOut">
               <a:rPr lang="en-US" smtClean="0"/>
               <a:pPr/>
-              <a:t>12/11/2016</a:t>
+              <a:t>12/14/2016</a:t>
             </a:fld>
             <a:endParaRPr lang="en-US" dirty="0"/>
           </a:p>
@@ -4165,7 +4166,7 @@
             <a:fld id="{57302355-E14B-8545-A8F8-0FE83CC9D524}" type="datetimeFigureOut">
               <a:rPr lang="en-US" smtClean="0"/>
               <a:pPr/>
-              <a:t>12/11/2016</a:t>
+              <a:t>12/14/2016</a:t>
             </a:fld>
             <a:endParaRPr lang="en-US" dirty="0"/>
           </a:p>
@@ -4644,7 +4645,7 @@
             <a:fld id="{02640F58-564D-2B4F-AE67-E407BA4FCF45}" type="datetimeFigureOut">
               <a:rPr lang="en-US" smtClean="0"/>
               <a:pPr/>
-              <a:t>12/11/2016</a:t>
+              <a:t>12/14/2016</a:t>
             </a:fld>
             <a:endParaRPr lang="en-US" dirty="0"/>
           </a:p>
@@ -4867,7 +4868,7 @@
             <a:fld id="{F13A34C8-038E-2045-AF43-DF7DBB8E0E9E}" type="datetimeFigureOut">
               <a:rPr lang="en-US" smtClean="0"/>
               <a:pPr/>
-              <a:t>12/11/2016</a:t>
+              <a:t>12/14/2016</a:t>
             </a:fld>
             <a:endParaRPr lang="en-US" dirty="0"/>
           </a:p>
@@ -4964,7 +4965,7 @@
             <a:fld id="{8818C68F-D26B-8F47-958C-23B49CF8A634}" type="datetimeFigureOut">
               <a:rPr lang="en-US" smtClean="0"/>
               <a:pPr/>
-              <a:t>12/11/2016</a:t>
+              <a:t>12/14/2016</a:t>
             </a:fld>
             <a:endParaRPr lang="en-US" dirty="0"/>
           </a:p>
@@ -5433,7 +5434,7 @@
             <a:fld id="{D0DF5E60-9974-AC48-9591-99C2BB44B7CF}" type="datetimeFigureOut">
               <a:rPr lang="en-US" smtClean="0"/>
               <a:pPr/>
-              <a:t>12/11/2016</a:t>
+              <a:t>12/14/2016</a:t>
             </a:fld>
             <a:endParaRPr lang="en-US" dirty="0"/>
           </a:p>
@@ -5748,7 +5749,7 @@
             <a:fld id="{18C79C5D-2A6F-F04D-97DA-BEF2467B64E4}" type="datetimeFigureOut">
               <a:rPr lang="en-US" smtClean="0"/>
               <a:pPr/>
-              <a:t>12/11/2016</a:t>
+              <a:t>12/14/2016</a:t>
             </a:fld>
             <a:endParaRPr lang="en-US" dirty="0"/>
           </a:p>
@@ -6020,7 +6021,7 @@
             <a:fld id="{09B482E8-6E0E-1B4F-B1FD-C69DB9E858D9}" type="datetimeFigureOut">
               <a:rPr lang="en-US" smtClean="0"/>
               <a:pPr/>
-              <a:t>12/11/2016</a:t>
+              <a:t>12/14/2016</a:t>
             </a:fld>
             <a:endParaRPr lang="en-US" dirty="0"/>
           </a:p>
@@ -6829,6 +6830,77 @@
 </p:sld>
 </file>
 
+<file path=ppt/slides/slide14.xml><?xml version="1.0" encoding="utf-8"?>
+<p:sld xmlns:a="http://schemas.openxmlformats.org/drawingml/2006/main" xmlns:r="http://schemas.openxmlformats.org/officeDocument/2006/relationships" xmlns:p="http://schemas.openxmlformats.org/presentationml/2006/main">
+  <p:cSld>
+    <p:spTree>
+      <p:nvGrpSpPr>
+        <p:cNvPr id="1" name=""/>
+        <p:cNvGrpSpPr/>
+        <p:nvPr/>
+      </p:nvGrpSpPr>
+      <p:grpSpPr>
+        <a:xfrm>
+          <a:off x="0" y="0"/>
+          <a:ext cx="0" cy="0"/>
+          <a:chOff x="0" y="0"/>
+          <a:chExt cx="0" cy="0"/>
+        </a:xfrm>
+      </p:grpSpPr>
+      <p:sp>
+        <p:nvSpPr>
+          <p:cNvPr id="4" name="Titel 3"/>
+          <p:cNvSpPr>
+            <a:spLocks noGrp="1"/>
+          </p:cNvSpPr>
+          <p:nvPr>
+            <p:ph type="title"/>
+          </p:nvPr>
+        </p:nvSpPr>
+        <p:spPr/>
+        <p:txBody>
+          <a:bodyPr/>
+          <a:lstStyle/>
+          <a:p>
+            <a:r>
+              <a:rPr lang="en-GB" dirty="0"/>
+              <a:t>Thanks for Your Attention</a:t>
+            </a:r>
+          </a:p>
+        </p:txBody>
+      </p:sp>
+      <p:sp>
+        <p:nvSpPr>
+          <p:cNvPr id="5" name="Textplatzhalter 4"/>
+          <p:cNvSpPr>
+            <a:spLocks noGrp="1"/>
+          </p:cNvSpPr>
+          <p:nvPr>
+            <p:ph type="body" idx="1"/>
+          </p:nvPr>
+        </p:nvSpPr>
+        <p:spPr/>
+        <p:txBody>
+          <a:bodyPr/>
+          <a:lstStyle/>
+          <a:p>
+            <a:endParaRPr lang="en-GB"/>
+          </a:p>
+        </p:txBody>
+      </p:sp>
+    </p:spTree>
+    <p:extLst>
+      <p:ext uri="{BB962C8B-B14F-4D97-AF65-F5344CB8AC3E}">
+        <p14:creationId xmlns:p14="http://schemas.microsoft.com/office/powerpoint/2010/main" val="3666593813"/>
+      </p:ext>
+    </p:extLst>
+  </p:cSld>
+  <p:clrMapOvr>
+    <a:masterClrMapping/>
+  </p:clrMapOvr>
+</p:sld>
+</file>
+
 <file path=ppt/slides/slide2.xml><?xml version="1.0" encoding="utf-8"?>
 <p:sld xmlns:a="http://schemas.openxmlformats.org/drawingml/2006/main" xmlns:r="http://schemas.openxmlformats.org/officeDocument/2006/relationships" xmlns:p="http://schemas.openxmlformats.org/presentationml/2006/main">
   <p:cSld>
@@ -7520,10 +7592,9 @@
           </a:p>
           <a:p>
             <a:r>
-              <a:rPr lang="en-GB" dirty="0" err="1"/>
-              <a:t>Gleichstellung</a:t>
-            </a:r>
-            <a:endParaRPr lang="en-GB" dirty="0"/>
+              <a:rPr lang="en-GB" dirty="0"/>
+              <a:t>Equality</a:t>
+            </a:r>
           </a:p>
         </p:txBody>
       </p:sp>

</xml_diff>

<commit_message>
Updated Chrome Driver to 2.9
</commit_message>
<xml_diff>
--- a/docs/MidTermSE.pptx
+++ b/docs/MidTermSE.pptx
@@ -5,7 +5,7 @@
     <p:sldMasterId id="2147483667" r:id="rId1"/>
   </p:sldMasterIdLst>
   <p:notesMasterIdLst>
-    <p:notesMasterId r:id="rId16"/>
+    <p:notesMasterId r:id="rId19"/>
   </p:notesMasterIdLst>
   <p:sldIdLst>
     <p:sldId id="256" r:id="rId2"/>
@@ -13,15 +13,18 @@
     <p:sldId id="258" r:id="rId4"/>
     <p:sldId id="261" r:id="rId5"/>
     <p:sldId id="269" r:id="rId6"/>
-    <p:sldId id="265" r:id="rId7"/>
-    <p:sldId id="268" r:id="rId8"/>
-    <p:sldId id="260" r:id="rId9"/>
-    <p:sldId id="259" r:id="rId10"/>
-    <p:sldId id="264" r:id="rId11"/>
-    <p:sldId id="266" r:id="rId12"/>
-    <p:sldId id="263" r:id="rId13"/>
-    <p:sldId id="262" r:id="rId14"/>
-    <p:sldId id="270" r:id="rId15"/>
+    <p:sldId id="272" r:id="rId7"/>
+    <p:sldId id="265" r:id="rId8"/>
+    <p:sldId id="271" r:id="rId9"/>
+    <p:sldId id="260" r:id="rId10"/>
+    <p:sldId id="268" r:id="rId11"/>
+    <p:sldId id="270" r:id="rId12"/>
+    <p:sldId id="273" r:id="rId13"/>
+    <p:sldId id="259" r:id="rId14"/>
+    <p:sldId id="264" r:id="rId15"/>
+    <p:sldId id="266" r:id="rId16"/>
+    <p:sldId id="263" r:id="rId17"/>
+    <p:sldId id="262" r:id="rId18"/>
   </p:sldIdLst>
   <p:sldSz cx="9144000" cy="6858000" type="screen4x3"/>
   <p:notesSz cx="6858000" cy="9144000"/>
@@ -210,7 +213,7 @@
           <a:p>
             <a:fld id="{FF8B4F5F-56C7-4005-BD2F-639DDA123AAA}" type="datetimeFigureOut">
               <a:rPr lang="en-GB" smtClean="0"/>
-              <a:t>14/12/2016</a:t>
+              <a:t>15/12/2016</a:t>
             </a:fld>
             <a:endParaRPr lang="en-GB"/>
           </a:p>
@@ -523,170 +526,10 @@
           <a:lstStyle/>
           <a:p>
             <a:r>
-              <a:rPr lang="en-GB" dirty="0"/>
-              <a:t>Maven -&gt; </a:t>
-            </a:r>
-            <a:r>
-              <a:rPr lang="en-GB" dirty="0" err="1"/>
-              <a:t>etabliert</a:t>
-            </a:r>
-            <a:endParaRPr lang="en-GB" dirty="0"/>
-          </a:p>
-          <a:p>
-            <a:r>
-              <a:rPr lang="en-GB" dirty="0"/>
-              <a:t>Java -&gt; Object</a:t>
-            </a:r>
-            <a:r>
-              <a:rPr lang="en-GB" baseline="0" dirty="0"/>
-              <a:t> Orientation</a:t>
-            </a:r>
-          </a:p>
-          <a:p>
-            <a:r>
-              <a:rPr lang="en-GB" baseline="0" dirty="0"/>
-              <a:t>Spring MVC -&gt; </a:t>
-            </a:r>
-            <a:r>
-              <a:rPr lang="en-GB" baseline="0" dirty="0" err="1"/>
-              <a:t>Bessere</a:t>
-            </a:r>
-            <a:r>
-              <a:rPr lang="en-GB" baseline="0" dirty="0"/>
-              <a:t> </a:t>
-            </a:r>
-            <a:r>
-              <a:rPr lang="en-GB" baseline="0" dirty="0" err="1"/>
-              <a:t>Kontrolle</a:t>
-            </a:r>
-            <a:r>
-              <a:rPr lang="en-GB" baseline="0" dirty="0"/>
-              <a:t> </a:t>
-            </a:r>
-            <a:r>
-              <a:rPr lang="en-GB" baseline="0" dirty="0" err="1"/>
-              <a:t>durhc</a:t>
-            </a:r>
-            <a:r>
-              <a:rPr lang="en-GB" baseline="0" dirty="0"/>
-              <a:t> </a:t>
-            </a:r>
-            <a:r>
-              <a:rPr lang="en-GB" baseline="0" dirty="0" err="1"/>
-              <a:t>klare</a:t>
-            </a:r>
-            <a:r>
-              <a:rPr lang="en-GB" baseline="0" dirty="0"/>
-              <a:t> </a:t>
-            </a:r>
-            <a:r>
-              <a:rPr lang="en-GB" baseline="0" dirty="0" err="1"/>
-              <a:t>Schnittstellen</a:t>
-            </a:r>
-            <a:r>
-              <a:rPr lang="en-GB" baseline="0" dirty="0"/>
-              <a:t> und </a:t>
-            </a:r>
-            <a:r>
-              <a:rPr lang="en-GB" baseline="0" dirty="0" err="1"/>
-              <a:t>Trennung</a:t>
-            </a:r>
-            <a:r>
-              <a:rPr lang="en-GB" baseline="0" dirty="0"/>
-              <a:t> von Modell, </a:t>
-            </a:r>
-            <a:r>
-              <a:rPr lang="en-GB" baseline="0" dirty="0" err="1"/>
-              <a:t>Sicht</a:t>
-            </a:r>
-            <a:r>
-              <a:rPr lang="en-GB" baseline="0" dirty="0"/>
-              <a:t> und </a:t>
-            </a:r>
-            <a:r>
-              <a:rPr lang="en-GB" baseline="0" dirty="0" err="1"/>
-              <a:t>Kontrolle</a:t>
-            </a:r>
-            <a:endParaRPr lang="en-GB" baseline="0" dirty="0"/>
-          </a:p>
-          <a:p>
-            <a:r>
-              <a:rPr lang="en-GB" baseline="0" dirty="0"/>
-              <a:t>SQL </a:t>
-            </a:r>
-            <a:r>
-              <a:rPr lang="en-GB" baseline="0" dirty="0" err="1"/>
-              <a:t>Datenbank</a:t>
-            </a:r>
-            <a:r>
-              <a:rPr lang="en-GB" baseline="0" dirty="0"/>
-              <a:t> -&gt; SQL Standard, stabile Software, </a:t>
-            </a:r>
-            <a:r>
-              <a:rPr lang="en-GB" baseline="0" dirty="0" err="1"/>
-              <a:t>viele</a:t>
-            </a:r>
-            <a:r>
-              <a:rPr lang="en-GB" baseline="0" dirty="0"/>
-              <a:t> </a:t>
-            </a:r>
-            <a:r>
-              <a:rPr lang="en-GB" baseline="0" dirty="0" err="1"/>
-              <a:t>vorgefertigte</a:t>
-            </a:r>
-            <a:r>
-              <a:rPr lang="en-GB" baseline="0" dirty="0"/>
-              <a:t> Software</a:t>
-            </a:r>
-          </a:p>
-          <a:p>
-            <a:r>
-              <a:rPr lang="en-GB" baseline="0" dirty="0" err="1"/>
-              <a:t>Webapp</a:t>
-            </a:r>
-            <a:r>
-              <a:rPr lang="en-GB" baseline="0" dirty="0"/>
-              <a:t>-Runner -&gt; WAR (</a:t>
-            </a:r>
-            <a:r>
-              <a:rPr lang="en-GB" baseline="0" dirty="0" err="1"/>
-              <a:t>WebArchive</a:t>
-            </a:r>
-            <a:r>
-              <a:rPr lang="en-GB" baseline="0" dirty="0"/>
-              <a:t>) l</a:t>
-            </a:r>
-            <a:r>
-              <a:rPr lang="de-DE" baseline="0" dirty="0" err="1"/>
-              <a:t>ässt</a:t>
-            </a:r>
-            <a:r>
-              <a:rPr lang="de-DE" baseline="0" dirty="0"/>
-              <a:t> sich leicht auf vielen Plattformen aufsetzen </a:t>
-            </a:r>
-            <a:r>
-              <a:rPr lang="en-GB" baseline="0" dirty="0"/>
-              <a:t>-&gt; </a:t>
-            </a:r>
-            <a:r>
-              <a:rPr lang="en-GB" baseline="0" dirty="0" err="1"/>
-              <a:t>Verbreitung</a:t>
-            </a:r>
-            <a:r>
-              <a:rPr lang="en-GB" baseline="0" dirty="0"/>
-              <a:t> auf </a:t>
-            </a:r>
-            <a:r>
-              <a:rPr lang="en-GB" baseline="0" dirty="0" err="1"/>
-              <a:t>mehr</a:t>
-            </a:r>
-            <a:r>
-              <a:rPr lang="en-GB" baseline="0" dirty="0"/>
-              <a:t> </a:t>
-            </a:r>
-            <a:r>
-              <a:rPr lang="en-GB" baseline="0" dirty="0" err="1"/>
-              <a:t>Servern</a:t>
+              <a:rPr lang="en-GB" dirty="0">
+                <a:sym typeface="Wingdings" panose="05000000000000000000" pitchFamily="2" charset="2"/>
+              </a:rPr>
+              <a:t> SRS</a:t>
             </a:r>
             <a:endParaRPr lang="en-GB" dirty="0"/>
           </a:p>
@@ -709,7 +552,7 @@
           <a:p>
             <a:fld id="{30AED992-AF63-4299-9568-E18C1557A9D3}" type="slidenum">
               <a:rPr lang="en-GB" smtClean="0"/>
-              <a:t>8</a:t>
+              <a:t>4</a:t>
             </a:fld>
             <a:endParaRPr lang="en-GB"/>
           </a:p>
@@ -718,7 +561,7 @@
     </p:spTree>
     <p:extLst>
       <p:ext uri="{BB962C8B-B14F-4D97-AF65-F5344CB8AC3E}">
-        <p14:creationId xmlns:p14="http://schemas.microsoft.com/office/powerpoint/2010/main" val="2103056620"/>
+        <p14:creationId xmlns:p14="http://schemas.microsoft.com/office/powerpoint/2010/main" val="2907770562"/>
       </p:ext>
     </p:extLst>
   </p:cSld>
@@ -773,16 +616,42 @@
           <a:lstStyle/>
           <a:p>
             <a:r>
+              <a:rPr lang="en-GB" dirty="0">
+                <a:sym typeface="Wingdings" panose="05000000000000000000" pitchFamily="2" charset="2"/>
+              </a:rPr>
+              <a:t> SAD</a:t>
+            </a:r>
+            <a:endParaRPr lang="en-GB" dirty="0"/>
+          </a:p>
+          <a:p>
+            <a:r>
               <a:rPr lang="en-GB" dirty="0"/>
-              <a:t>Jira</a:t>
+              <a:t>Maven -&gt; </a:t>
+            </a:r>
+            <a:r>
+              <a:rPr lang="en-GB" dirty="0" err="1"/>
+              <a:t>etabliert</a:t>
+            </a:r>
+            <a:endParaRPr lang="en-GB" dirty="0"/>
+          </a:p>
+          <a:p>
+            <a:r>
+              <a:rPr lang="en-GB" dirty="0"/>
+              <a:t>Java -&gt; Object</a:t>
             </a:r>
             <a:r>
               <a:rPr lang="en-GB" baseline="0" dirty="0"/>
-              <a:t> -&gt; An </a:t>
+              <a:t> Orientation</a:t>
+            </a:r>
+          </a:p>
+          <a:p>
+            <a:r>
+              <a:rPr lang="en-GB" baseline="0" dirty="0"/>
+              <a:t>Spring MVC -&gt; </a:t>
             </a:r>
             <a:r>
               <a:rPr lang="en-GB" baseline="0" dirty="0" err="1"/>
-              <a:t>keine</a:t>
+              <a:t>Bessere</a:t>
             </a:r>
             <a:r>
               <a:rPr lang="en-GB" baseline="0" dirty="0"/>
@@ -790,15 +659,7 @@
             </a:r>
             <a:r>
               <a:rPr lang="en-GB" baseline="0" dirty="0" err="1"/>
-              <a:t>Plattform</a:t>
-            </a:r>
-            <a:r>
-              <a:rPr lang="en-GB" baseline="0" dirty="0"/>
-              <a:t>, so </a:t>
-            </a:r>
-            <a:r>
-              <a:rPr lang="en-GB" baseline="0" dirty="0" err="1"/>
-              <a:t>wie</a:t>
+              <a:t>Kontrolle</a:t>
             </a:r>
             <a:r>
               <a:rPr lang="en-GB" baseline="0" dirty="0"/>
@@ -806,7 +667,7 @@
             </a:r>
             <a:r>
               <a:rPr lang="en-GB" baseline="0" dirty="0" err="1"/>
-              <a:t>YouTrack</a:t>
+              <a:t>durhc</a:t>
             </a:r>
             <a:r>
               <a:rPr lang="en-GB" baseline="0" dirty="0"/>
@@ -814,11 +675,54 @@
             </a:r>
             <a:r>
               <a:rPr lang="en-GB" baseline="0" dirty="0" err="1"/>
-              <a:t>gebunden</a:t>
+              <a:t>klare</a:t>
             </a:r>
             <a:r>
               <a:rPr lang="en-GB" baseline="0" dirty="0"/>
-              <a:t>, </a:t>
+              <a:t> </a:t>
+            </a:r>
+            <a:r>
+              <a:rPr lang="en-GB" baseline="0" dirty="0" err="1"/>
+              <a:t>Schnittstellen</a:t>
+            </a:r>
+            <a:r>
+              <a:rPr lang="en-GB" baseline="0" dirty="0"/>
+              <a:t> und </a:t>
+            </a:r>
+            <a:r>
+              <a:rPr lang="en-GB" baseline="0" dirty="0" err="1"/>
+              <a:t>Trennung</a:t>
+            </a:r>
+            <a:r>
+              <a:rPr lang="en-GB" baseline="0" dirty="0"/>
+              <a:t> von Modell, </a:t>
+            </a:r>
+            <a:r>
+              <a:rPr lang="en-GB" baseline="0" dirty="0" err="1"/>
+              <a:t>Sicht</a:t>
+            </a:r>
+            <a:r>
+              <a:rPr lang="en-GB" baseline="0" dirty="0"/>
+              <a:t> und </a:t>
+            </a:r>
+            <a:r>
+              <a:rPr lang="en-GB" baseline="0" dirty="0" err="1"/>
+              <a:t>Kontrolle</a:t>
+            </a:r>
+            <a:endParaRPr lang="en-GB" baseline="0" dirty="0"/>
+          </a:p>
+          <a:p>
+            <a:r>
+              <a:rPr lang="en-GB" baseline="0" dirty="0"/>
+              <a:t>SQL </a:t>
+            </a:r>
+            <a:r>
+              <a:rPr lang="en-GB" baseline="0" dirty="0" err="1"/>
+              <a:t>Datenbank</a:t>
+            </a:r>
+            <a:r>
+              <a:rPr lang="en-GB" baseline="0" dirty="0"/>
+              <a:t> -&gt; SQL Standard, stabile Software, </a:t>
             </a:r>
             <a:r>
               <a:rPr lang="en-GB" baseline="0" dirty="0" err="1"/>
@@ -826,27 +730,57 @@
             </a:r>
             <a:r>
               <a:rPr lang="en-GB" baseline="0" dirty="0"/>
-              <a:t> Plugins, </a:t>
+              <a:t> </a:t>
             </a:r>
             <a:r>
               <a:rPr lang="en-GB" baseline="0" dirty="0" err="1"/>
-              <a:t>Implementationen</a:t>
+              <a:t>vorgefertigte</a:t>
             </a:r>
             <a:r>
               <a:rPr lang="en-GB" baseline="0" dirty="0"/>
-              <a:t> f</a:t>
+              <a:t> Software</a:t>
+            </a:r>
+          </a:p>
+          <a:p>
+            <a:r>
+              <a:rPr lang="en-GB" baseline="0" dirty="0" err="1"/>
+              <a:t>Webapp</a:t>
+            </a:r>
+            <a:r>
+              <a:rPr lang="en-GB" baseline="0" dirty="0"/>
+              <a:t>-Runner -&gt; WAR (</a:t>
+            </a:r>
+            <a:r>
+              <a:rPr lang="en-GB" baseline="0" dirty="0" err="1"/>
+              <a:t>WebArchive</a:t>
+            </a:r>
+            <a:r>
+              <a:rPr lang="en-GB" baseline="0" dirty="0"/>
+              <a:t>) l</a:t>
+            </a:r>
+            <a:r>
+              <a:rPr lang="de-DE" baseline="0" dirty="0" err="1"/>
+              <a:t>ässt</a:t>
             </a:r>
             <a:r>
               <a:rPr lang="de-DE" baseline="0" dirty="0"/>
-              <a:t>ü</a:t>
+              <a:t> sich leicht auf vielen Plattformen aufsetzen </a:t>
             </a:r>
             <a:r>
               <a:rPr lang="en-GB" baseline="0" dirty="0"/>
-              <a:t>r </a:t>
+              <a:t>-&gt; </a:t>
             </a:r>
             <a:r>
               <a:rPr lang="en-GB" baseline="0" dirty="0" err="1"/>
-              <a:t>viele</a:t>
+              <a:t>Verbreitung</a:t>
+            </a:r>
+            <a:r>
+              <a:rPr lang="en-GB" baseline="0" dirty="0"/>
+              <a:t> auf </a:t>
+            </a:r>
+            <a:r>
+              <a:rPr lang="en-GB" baseline="0" dirty="0" err="1"/>
+              <a:t>mehr</a:t>
             </a:r>
             <a:r>
               <a:rPr lang="en-GB" baseline="0" dirty="0"/>
@@ -854,97 +788,8 @@
             </a:r>
             <a:r>
               <a:rPr lang="en-GB" baseline="0" dirty="0" err="1"/>
-              <a:t>Entwicklungsumgebungen</a:t>
-            </a:r>
-            <a:endParaRPr lang="en-GB" baseline="0" dirty="0"/>
-          </a:p>
-          <a:p>
-            <a:r>
-              <a:rPr lang="en-GB" baseline="0" dirty="0"/>
-              <a:t>Scrumming -&gt; </a:t>
-            </a:r>
-            <a:r>
-              <a:rPr lang="en-GB" baseline="0" dirty="0" err="1"/>
-              <a:t>Fortschritt</a:t>
-            </a:r>
-            <a:r>
-              <a:rPr lang="en-GB" baseline="0" dirty="0"/>
-              <a:t> </a:t>
-            </a:r>
-            <a:r>
-              <a:rPr lang="en-GB" baseline="0" dirty="0" err="1"/>
-              <a:t>ist</a:t>
-            </a:r>
-            <a:r>
-              <a:rPr lang="en-GB" baseline="0" dirty="0"/>
-              <a:t> </a:t>
-            </a:r>
-            <a:r>
-              <a:rPr lang="en-GB" baseline="0" dirty="0" err="1"/>
-              <a:t>immer</a:t>
-            </a:r>
-            <a:r>
-              <a:rPr lang="en-GB" baseline="0" dirty="0"/>
-              <a:t> </a:t>
-            </a:r>
-            <a:r>
-              <a:rPr lang="en-GB" baseline="0" dirty="0" err="1"/>
-              <a:t>sichtbar</a:t>
-            </a:r>
-            <a:r>
-              <a:rPr lang="en-GB" baseline="0" dirty="0"/>
-              <a:t>, </a:t>
-            </a:r>
-            <a:r>
-              <a:rPr lang="en-GB" baseline="0" dirty="0" err="1"/>
-              <a:t>Iterationen</a:t>
-            </a:r>
-            <a:endParaRPr lang="en-GB" baseline="0" dirty="0"/>
-          </a:p>
-          <a:p>
-            <a:r>
-              <a:rPr lang="en-GB" baseline="0" dirty="0" err="1"/>
-              <a:t>Gleichstellung</a:t>
-            </a:r>
-            <a:r>
-              <a:rPr lang="en-GB" baseline="0" dirty="0"/>
-              <a:t> -&gt; </a:t>
-            </a:r>
-            <a:r>
-              <a:rPr lang="en-GB" baseline="0" dirty="0" err="1"/>
-              <a:t>Verbesserte</a:t>
-            </a:r>
-            <a:r>
-              <a:rPr lang="en-GB" baseline="0" dirty="0"/>
-              <a:t> </a:t>
-            </a:r>
-            <a:r>
-              <a:rPr lang="en-GB" baseline="0" dirty="0" err="1"/>
-              <a:t>Kreativit</a:t>
-            </a:r>
-            <a:r>
-              <a:rPr lang="de-DE" baseline="0" dirty="0" err="1"/>
-              <a:t>ät</a:t>
-            </a:r>
-            <a:r>
-              <a:rPr lang="en-GB" baseline="0" dirty="0"/>
-              <a:t> und Motivation, </a:t>
-            </a:r>
-            <a:r>
-              <a:rPr lang="en-GB" baseline="0" dirty="0" err="1"/>
-              <a:t>eigene</a:t>
-            </a:r>
-            <a:r>
-              <a:rPr lang="en-GB" baseline="0" dirty="0"/>
-              <a:t> </a:t>
-            </a:r>
-            <a:r>
-              <a:rPr lang="en-GB" baseline="0" dirty="0" err="1"/>
-              <a:t>Verantwortung</a:t>
-            </a:r>
-            <a:endParaRPr lang="en-GB" baseline="0" dirty="0"/>
-          </a:p>
-          <a:p>
+              <a:t>Servern</a:t>
+            </a:r>
             <a:endParaRPr lang="en-GB" dirty="0"/>
           </a:p>
         </p:txBody>
@@ -975,7 +820,7 @@
     </p:spTree>
     <p:extLst>
       <p:ext uri="{BB962C8B-B14F-4D97-AF65-F5344CB8AC3E}">
-        <p14:creationId xmlns:p14="http://schemas.microsoft.com/office/powerpoint/2010/main" val="3118112137"/>
+        <p14:creationId xmlns:p14="http://schemas.microsoft.com/office/powerpoint/2010/main" val="2103056620"/>
       </p:ext>
     </p:extLst>
   </p:cSld>
@@ -1031,63 +876,177 @@
           <a:p>
             <a:r>
               <a:rPr lang="en-GB" dirty="0"/>
-              <a:t>Junit -&gt; </a:t>
-            </a:r>
-            <a:r>
-              <a:rPr lang="en-GB" dirty="0" err="1"/>
-              <a:t>Korrektheit</a:t>
+              <a:t>Jira</a:t>
             </a:r>
             <a:r>
               <a:rPr lang="en-GB" baseline="0" dirty="0"/>
-              <a:t> des </a:t>
+              <a:t> -&gt; An </a:t>
             </a:r>
             <a:r>
               <a:rPr lang="en-GB" baseline="0" dirty="0" err="1"/>
-              <a:t>Modells</a:t>
+              <a:t>keine</a:t>
             </a:r>
             <a:r>
               <a:rPr lang="en-GB" baseline="0" dirty="0"/>
               <a:t> </a:t>
             </a:r>
             <a:r>
+              <a:rPr lang="en-GB" baseline="0" dirty="0" err="1"/>
+              <a:t>Plattform</a:t>
+            </a:r>
+            <a:r>
+              <a:rPr lang="en-GB" baseline="0" dirty="0"/>
+              <a:t>, so </a:t>
+            </a:r>
+            <a:r>
+              <a:rPr lang="en-GB" baseline="0" dirty="0" err="1"/>
+              <a:t>wie</a:t>
+            </a:r>
+            <a:r>
+              <a:rPr lang="en-GB" baseline="0" dirty="0"/>
+              <a:t> </a:t>
+            </a:r>
+            <a:r>
+              <a:rPr lang="en-GB" baseline="0" dirty="0" err="1"/>
+              <a:t>YouTrack</a:t>
+            </a:r>
+            <a:r>
+              <a:rPr lang="en-GB" baseline="0" dirty="0"/>
+              <a:t> </a:t>
+            </a:r>
+            <a:r>
+              <a:rPr lang="en-GB" baseline="0" dirty="0" err="1"/>
+              <a:t>gebunden</a:t>
+            </a:r>
+            <a:r>
+              <a:rPr lang="en-GB" baseline="0" dirty="0"/>
+              <a:t>, </a:t>
+            </a:r>
+            <a:r>
+              <a:rPr lang="en-GB" baseline="0" dirty="0" err="1"/>
+              <a:t>viele</a:t>
+            </a:r>
+            <a:r>
+              <a:rPr lang="en-GB" baseline="0" dirty="0"/>
+              <a:t> Plugins, </a:t>
+            </a:r>
+            <a:r>
+              <a:rPr lang="en-GB" baseline="0" dirty="0" err="1"/>
+              <a:t>Implementationen</a:t>
+            </a:r>
+            <a:r>
+              <a:rPr lang="en-GB" baseline="0" dirty="0"/>
+              <a:t> f</a:t>
+            </a:r>
+            <a:r>
               <a:rPr lang="de-DE" baseline="0" dirty="0"/>
-              <a:t>prüfen</a:t>
+              <a:t>ü</a:t>
+            </a:r>
+            <a:r>
+              <a:rPr lang="en-GB" baseline="0" dirty="0"/>
+              <a:t>r </a:t>
+            </a:r>
+            <a:r>
+              <a:rPr lang="en-GB" baseline="0" dirty="0" err="1"/>
+              <a:t>viele</a:t>
+            </a:r>
+            <a:r>
+              <a:rPr lang="en-GB" baseline="0" dirty="0"/>
+              <a:t> </a:t>
+            </a:r>
+            <a:r>
+              <a:rPr lang="en-GB" baseline="0" dirty="0" err="1"/>
+              <a:t>Entwicklungsumgebungen</a:t>
             </a:r>
             <a:endParaRPr lang="en-GB" baseline="0" dirty="0"/>
           </a:p>
           <a:p>
             <a:r>
               <a:rPr lang="en-GB" baseline="0" dirty="0"/>
-              <a:t>Cucumber + Selenium -&gt; </a:t>
+              <a:t>Scrumming -&gt; </a:t>
             </a:r>
             <a:r>
               <a:rPr lang="en-GB" baseline="0" dirty="0" err="1"/>
-              <a:t>automatische</a:t>
+              <a:t>Fortschritt</a:t>
             </a:r>
             <a:r>
               <a:rPr lang="en-GB" baseline="0" dirty="0"/>
-              <a:t> Tests </a:t>
+              <a:t> </a:t>
             </a:r>
             <a:r>
               <a:rPr lang="en-GB" baseline="0" dirty="0" err="1"/>
-              <a:t>im</a:t>
+              <a:t>ist</a:t>
             </a:r>
             <a:r>
               <a:rPr lang="en-GB" baseline="0" dirty="0"/>
-              <a:t> Browser, </a:t>
+              <a:t> </a:t>
             </a:r>
             <a:r>
               <a:rPr lang="en-GB" baseline="0" dirty="0" err="1"/>
-              <a:t>berschiedene</a:t>
+              <a:t>immer</a:t>
             </a:r>
             <a:r>
               <a:rPr lang="en-GB" baseline="0" dirty="0"/>
-              <a:t> Browser m</a:t>
+              <a:t> </a:t>
+            </a:r>
+            <a:r>
+              <a:rPr lang="en-GB" baseline="0" dirty="0" err="1"/>
+              <a:t>sichtbar</a:t>
+            </a:r>
+            <a:r>
+              <a:rPr lang="en-GB" baseline="0" dirty="0"/>
+              <a:t>, </a:t>
+            </a:r>
+            <a:r>
+              <a:rPr lang="en-GB" baseline="0" dirty="0" err="1"/>
+              <a:t>Iterationen</a:t>
+            </a:r>
+            <a:endParaRPr lang="en-GB" baseline="0" dirty="0"/>
+          </a:p>
+          <a:p>
+            <a:r>
+              <a:rPr lang="en-GB" baseline="0" dirty="0" err="1"/>
+              <a:t>Gleichstellung</a:t>
+            </a:r>
+            <a:r>
+              <a:rPr lang="en-GB" baseline="0" dirty="0"/>
+              <a:t> -&gt; </a:t>
+            </a:r>
+            <a:r>
+              <a:rPr lang="en-GB" baseline="0" dirty="0" err="1"/>
+              <a:t>Verbesserte</a:t>
+            </a:r>
+            <a:r>
+              <a:rPr lang="en-GB" baseline="0" dirty="0"/>
+              <a:t> </a:t>
+            </a:r>
+            <a:r>
+              <a:rPr lang="en-GB" baseline="0" dirty="0" err="1"/>
+              <a:t>Kreativit</a:t>
             </a:r>
             <a:r>
               <a:rPr lang="de-DE" baseline="0" dirty="0" err="1"/>
-              <a:t>öglich</a:t>
-            </a:r>
+              <a:t>ät</a:t>
+            </a:r>
+            <a:r>
+              <a:rPr lang="en-GB" baseline="0" dirty="0"/>
+              <a:t> und Motivation, </a:t>
+            </a:r>
+            <a:r>
+              <a:rPr lang="en-GB" baseline="0" dirty="0" err="1"/>
+              <a:t>eigene</a:t>
+            </a:r>
+            <a:r>
+              <a:rPr lang="en-GB" baseline="0" dirty="0"/>
+              <a:t> </a:t>
+            </a:r>
+            <a:r>
+              <a:rPr lang="en-GB" baseline="0" dirty="0" err="1"/>
+              <a:t>Verantwortung</a:t>
+            </a:r>
+            <a:endParaRPr lang="en-GB" baseline="0" dirty="0"/>
+          </a:p>
+          <a:p>
             <a:endParaRPr lang="en-GB" dirty="0"/>
           </a:p>
         </p:txBody>
@@ -1110,6 +1069,149 @@
             <a:fld id="{30AED992-AF63-4299-9568-E18C1557A9D3}" type="slidenum">
               <a:rPr lang="en-GB" smtClean="0"/>
               <a:t>13</a:t>
+            </a:fld>
+            <a:endParaRPr lang="en-GB"/>
+          </a:p>
+        </p:txBody>
+      </p:sp>
+    </p:spTree>
+    <p:extLst>
+      <p:ext uri="{BB962C8B-B14F-4D97-AF65-F5344CB8AC3E}">
+        <p14:creationId xmlns:p14="http://schemas.microsoft.com/office/powerpoint/2010/main" val="3118112137"/>
+      </p:ext>
+    </p:extLst>
+  </p:cSld>
+  <p:clrMapOvr>
+    <a:masterClrMapping/>
+  </p:clrMapOvr>
+</p:notes>
+</file>
+
+<file path=ppt/notesSlides/notesSlide4.xml><?xml version="1.0" encoding="utf-8"?>
+<p:notes xmlns:a="http://schemas.openxmlformats.org/drawingml/2006/main" xmlns:r="http://schemas.openxmlformats.org/officeDocument/2006/relationships" xmlns:p="http://schemas.openxmlformats.org/presentationml/2006/main">
+  <p:cSld>
+    <p:spTree>
+      <p:nvGrpSpPr>
+        <p:cNvPr id="1" name=""/>
+        <p:cNvGrpSpPr/>
+        <p:nvPr/>
+      </p:nvGrpSpPr>
+      <p:grpSpPr>
+        <a:xfrm>
+          <a:off x="0" y="0"/>
+          <a:ext cx="0" cy="0"/>
+          <a:chOff x="0" y="0"/>
+          <a:chExt cx="0" cy="0"/>
+        </a:xfrm>
+      </p:grpSpPr>
+      <p:sp>
+        <p:nvSpPr>
+          <p:cNvPr id="2" name="Folienbildplatzhalter 1"/>
+          <p:cNvSpPr>
+            <a:spLocks noGrp="1" noRot="1" noChangeAspect="1"/>
+          </p:cNvSpPr>
+          <p:nvPr>
+            <p:ph type="sldImg"/>
+          </p:nvPr>
+        </p:nvSpPr>
+        <p:spPr/>
+      </p:sp>
+      <p:sp>
+        <p:nvSpPr>
+          <p:cNvPr id="3" name="Notizenplatzhalter 2"/>
+          <p:cNvSpPr>
+            <a:spLocks noGrp="1"/>
+          </p:cNvSpPr>
+          <p:nvPr>
+            <p:ph type="body" idx="1"/>
+          </p:nvPr>
+        </p:nvSpPr>
+        <p:spPr/>
+        <p:txBody>
+          <a:bodyPr/>
+          <a:lstStyle/>
+          <a:p>
+            <a:r>
+              <a:rPr lang="en-GB" dirty="0"/>
+              <a:t>Junit -&gt; </a:t>
+            </a:r>
+            <a:r>
+              <a:rPr lang="en-GB" dirty="0" err="1"/>
+              <a:t>Korrektheit</a:t>
+            </a:r>
+            <a:r>
+              <a:rPr lang="en-GB" baseline="0" dirty="0"/>
+              <a:t> des </a:t>
+            </a:r>
+            <a:r>
+              <a:rPr lang="en-GB" baseline="0" dirty="0" err="1"/>
+              <a:t>Modells</a:t>
+            </a:r>
+            <a:r>
+              <a:rPr lang="en-GB" baseline="0" dirty="0"/>
+              <a:t> </a:t>
+            </a:r>
+            <a:r>
+              <a:rPr lang="de-DE" baseline="0" dirty="0"/>
+              <a:t>prüfen</a:t>
+            </a:r>
+            <a:endParaRPr lang="en-GB" baseline="0" dirty="0"/>
+          </a:p>
+          <a:p>
+            <a:r>
+              <a:rPr lang="en-GB" baseline="0" dirty="0"/>
+              <a:t>Cucumber + Selenium -&gt; </a:t>
+            </a:r>
+            <a:r>
+              <a:rPr lang="en-GB" baseline="0" dirty="0" err="1"/>
+              <a:t>automatische</a:t>
+            </a:r>
+            <a:r>
+              <a:rPr lang="en-GB" baseline="0" dirty="0"/>
+              <a:t> Tests </a:t>
+            </a:r>
+            <a:r>
+              <a:rPr lang="en-GB" baseline="0" dirty="0" err="1"/>
+              <a:t>im</a:t>
+            </a:r>
+            <a:r>
+              <a:rPr lang="en-GB" baseline="0" dirty="0"/>
+              <a:t> Browser, </a:t>
+            </a:r>
+            <a:r>
+              <a:rPr lang="en-GB" baseline="0" dirty="0" err="1"/>
+              <a:t>berschiedene</a:t>
+            </a:r>
+            <a:r>
+              <a:rPr lang="en-GB" baseline="0" dirty="0"/>
+              <a:t> Browser m</a:t>
+            </a:r>
+            <a:r>
+              <a:rPr lang="de-DE" baseline="0" dirty="0" err="1"/>
+              <a:t>öglich</a:t>
+            </a:r>
+            <a:endParaRPr lang="en-GB" dirty="0"/>
+          </a:p>
+        </p:txBody>
+      </p:sp>
+      <p:sp>
+        <p:nvSpPr>
+          <p:cNvPr id="4" name="Foliennummernplatzhalter 3"/>
+          <p:cNvSpPr>
+            <a:spLocks noGrp="1"/>
+          </p:cNvSpPr>
+          <p:nvPr>
+            <p:ph type="sldNum" sz="quarter" idx="10"/>
+          </p:nvPr>
+        </p:nvSpPr>
+        <p:spPr/>
+        <p:txBody>
+          <a:bodyPr/>
+          <a:lstStyle/>
+          <a:p>
+            <a:fld id="{30AED992-AF63-4299-9568-E18C1557A9D3}" type="slidenum">
+              <a:rPr lang="en-GB" smtClean="0"/>
+              <a:t>17</a:t>
             </a:fld>
             <a:endParaRPr lang="en-GB"/>
           </a:p>
@@ -1416,7 +1518,7 @@
             <a:fld id="{08B9EBBA-996F-894A-B54A-D6246ED52CEA}" type="datetimeFigureOut">
               <a:rPr lang="en-US" smtClean="0"/>
               <a:pPr/>
-              <a:t>12/14/2016</a:t>
+              <a:t>12/15/2016</a:t>
             </a:fld>
             <a:endParaRPr lang="en-US" dirty="0"/>
           </a:p>
@@ -1736,7 +1838,7 @@
             <a:fld id="{18C79C5D-2A6F-F04D-97DA-BEF2467B64E4}" type="datetimeFigureOut">
               <a:rPr lang="en-US" smtClean="0"/>
               <a:pPr/>
-              <a:t>12/14/2016</a:t>
+              <a:t>12/15/2016</a:t>
             </a:fld>
             <a:endParaRPr lang="en-US" dirty="0"/>
           </a:p>
@@ -2226,7 +2328,7 @@
             <a:fld id="{8DFA1846-DA80-1C48-A609-854EA85C59AD}" type="datetimeFigureOut">
               <a:rPr lang="en-US" smtClean="0"/>
               <a:pPr/>
-              <a:t>12/14/2016</a:t>
+              <a:t>12/15/2016</a:t>
             </a:fld>
             <a:endParaRPr lang="en-US" dirty="0"/>
           </a:p>
@@ -2597,7 +2699,7 @@
             <a:fld id="{FBF54567-0DE4-3F47-BF90-CB84690072F9}" type="datetimeFigureOut">
               <a:rPr lang="en-US" smtClean="0"/>
               <a:pPr/>
-              <a:t>12/14/2016</a:t>
+              <a:t>12/15/2016</a:t>
             </a:fld>
             <a:endParaRPr lang="en-US" dirty="0"/>
           </a:p>
@@ -2872,7 +2974,7 @@
             <a:fld id="{C6C52C72-DE31-F449-A4ED-4C594FD91407}" type="datetimeFigureOut">
               <a:rPr lang="en-US" smtClean="0"/>
               <a:pPr/>
-              <a:t>12/14/2016</a:t>
+              <a:t>12/15/2016</a:t>
             </a:fld>
             <a:endParaRPr lang="en-US" dirty="0"/>
           </a:p>
@@ -3200,7 +3302,7 @@
             <a:fld id="{ED62726E-379B-B349-9EED-81ED093FA806}" type="datetimeFigureOut">
               <a:rPr lang="en-US" smtClean="0"/>
               <a:pPr/>
-              <a:t>12/14/2016</a:t>
+              <a:t>12/15/2016</a:t>
             </a:fld>
             <a:endParaRPr lang="en-US" dirty="0"/>
           </a:p>
@@ -3480,7 +3582,7 @@
             <a:fld id="{9B3A1323-8D79-1946-B0D7-40001CF92E9D}" type="datetimeFigureOut">
               <a:rPr lang="en-US" smtClean="0"/>
               <a:pPr/>
-              <a:t>12/14/2016</a:t>
+              <a:t>12/15/2016</a:t>
             </a:fld>
             <a:endParaRPr lang="en-US" dirty="0"/>
           </a:p>
@@ -3825,7 +3927,7 @@
             <a:fld id="{8DFA1846-DA80-1C48-A609-854EA85C59AD}" type="datetimeFigureOut">
               <a:rPr lang="en-US" smtClean="0"/>
               <a:pPr/>
-              <a:t>12/14/2016</a:t>
+              <a:t>12/15/2016</a:t>
             </a:fld>
             <a:endParaRPr lang="en-US" dirty="0"/>
           </a:p>
@@ -4166,7 +4268,7 @@
             <a:fld id="{57302355-E14B-8545-A8F8-0FE83CC9D524}" type="datetimeFigureOut">
               <a:rPr lang="en-US" smtClean="0"/>
               <a:pPr/>
-              <a:t>12/14/2016</a:t>
+              <a:t>12/15/2016</a:t>
             </a:fld>
             <a:endParaRPr lang="en-US" dirty="0"/>
           </a:p>
@@ -4645,7 +4747,7 @@
             <a:fld id="{02640F58-564D-2B4F-AE67-E407BA4FCF45}" type="datetimeFigureOut">
               <a:rPr lang="en-US" smtClean="0"/>
               <a:pPr/>
-              <a:t>12/14/2016</a:t>
+              <a:t>12/15/2016</a:t>
             </a:fld>
             <a:endParaRPr lang="en-US" dirty="0"/>
           </a:p>
@@ -4868,7 +4970,7 @@
             <a:fld id="{F13A34C8-038E-2045-AF43-DF7DBB8E0E9E}" type="datetimeFigureOut">
               <a:rPr lang="en-US" smtClean="0"/>
               <a:pPr/>
-              <a:t>12/14/2016</a:t>
+              <a:t>12/15/2016</a:t>
             </a:fld>
             <a:endParaRPr lang="en-US" dirty="0"/>
           </a:p>
@@ -4965,7 +5067,7 @@
             <a:fld id="{8818C68F-D26B-8F47-958C-23B49CF8A634}" type="datetimeFigureOut">
               <a:rPr lang="en-US" smtClean="0"/>
               <a:pPr/>
-              <a:t>12/14/2016</a:t>
+              <a:t>12/15/2016</a:t>
             </a:fld>
             <a:endParaRPr lang="en-US" dirty="0"/>
           </a:p>
@@ -5434,7 +5536,7 @@
             <a:fld id="{D0DF5E60-9974-AC48-9591-99C2BB44B7CF}" type="datetimeFigureOut">
               <a:rPr lang="en-US" smtClean="0"/>
               <a:pPr/>
-              <a:t>12/14/2016</a:t>
+              <a:t>12/15/2016</a:t>
             </a:fld>
             <a:endParaRPr lang="en-US" dirty="0"/>
           </a:p>
@@ -5749,7 +5851,7 @@
             <a:fld id="{18C79C5D-2A6F-F04D-97DA-BEF2467B64E4}" type="datetimeFigureOut">
               <a:rPr lang="en-US" smtClean="0"/>
               <a:pPr/>
-              <a:t>12/14/2016</a:t>
+              <a:t>12/15/2016</a:t>
             </a:fld>
             <a:endParaRPr lang="en-US" dirty="0"/>
           </a:p>
@@ -6021,7 +6123,7 @@
             <a:fld id="{09B482E8-6E0E-1B4F-B1FD-C69DB9E858D9}" type="datetimeFigureOut">
               <a:rPr lang="en-US" smtClean="0"/>
               <a:pPr/>
-              <a:t>12/14/2016</a:t>
+              <a:t>12/15/2016</a:t>
             </a:fld>
             <a:endParaRPr lang="en-US" dirty="0"/>
           </a:p>
@@ -6564,7 +6666,320 @@
           <a:p>
             <a:r>
               <a:rPr lang="en-GB" dirty="0"/>
-              <a:t>Example Burndown Chart</a:t>
+              <a:t>Technology - Architecture</a:t>
+            </a:r>
+          </a:p>
+        </p:txBody>
+      </p:sp>
+      <p:pic>
+        <p:nvPicPr>
+          <p:cNvPr id="4" name="Grafik 3"/>
+          <p:cNvPicPr>
+            <a:picLocks noChangeAspect="1"/>
+          </p:cNvPicPr>
+          <p:nvPr/>
+        </p:nvPicPr>
+        <p:blipFill>
+          <a:blip r:embed="rId2"/>
+          <a:stretch>
+            <a:fillRect/>
+          </a:stretch>
+        </p:blipFill>
+        <p:spPr>
+          <a:xfrm>
+            <a:off x="2042028" y="1905948"/>
+            <a:ext cx="5059940" cy="4952052"/>
+          </a:xfrm>
+          <a:prstGeom prst="rect">
+            <a:avLst/>
+          </a:prstGeom>
+        </p:spPr>
+      </p:pic>
+    </p:spTree>
+    <p:extLst>
+      <p:ext uri="{BB962C8B-B14F-4D97-AF65-F5344CB8AC3E}">
+        <p14:creationId xmlns:p14="http://schemas.microsoft.com/office/powerpoint/2010/main" val="3430134587"/>
+      </p:ext>
+    </p:extLst>
+  </p:cSld>
+  <p:clrMapOvr>
+    <a:masterClrMapping/>
+  </p:clrMapOvr>
+</p:sld>
+</file>
+
+<file path=ppt/slides/slide11.xml><?xml version="1.0" encoding="utf-8"?>
+<p:sld xmlns:a="http://schemas.openxmlformats.org/drawingml/2006/main" xmlns:r="http://schemas.openxmlformats.org/officeDocument/2006/relationships" xmlns:p="http://schemas.openxmlformats.org/presentationml/2006/main">
+  <p:cSld>
+    <p:spTree>
+      <p:nvGrpSpPr>
+        <p:cNvPr id="1" name=""/>
+        <p:cNvGrpSpPr/>
+        <p:nvPr/>
+      </p:nvGrpSpPr>
+      <p:grpSpPr>
+        <a:xfrm>
+          <a:off x="0" y="0"/>
+          <a:ext cx="0" cy="0"/>
+          <a:chOff x="0" y="0"/>
+          <a:chExt cx="0" cy="0"/>
+        </a:xfrm>
+      </p:grpSpPr>
+      <p:sp>
+        <p:nvSpPr>
+          <p:cNvPr id="2" name="Titel 1"/>
+          <p:cNvSpPr>
+            <a:spLocks noGrp="1"/>
+          </p:cNvSpPr>
+          <p:nvPr>
+            <p:ph type="title"/>
+          </p:nvPr>
+        </p:nvSpPr>
+        <p:spPr/>
+        <p:txBody>
+          <a:bodyPr/>
+          <a:lstStyle/>
+          <a:p>
+            <a:r>
+              <a:rPr lang="en-GB" dirty="0"/>
+              <a:t>Technology - Architecture</a:t>
+            </a:r>
+          </a:p>
+        </p:txBody>
+      </p:sp>
+      <p:pic>
+        <p:nvPicPr>
+          <p:cNvPr id="3" name="Grafik 2"/>
+          <p:cNvPicPr>
+            <a:picLocks noChangeAspect="1"/>
+          </p:cNvPicPr>
+          <p:nvPr/>
+        </p:nvPicPr>
+        <p:blipFill>
+          <a:blip r:embed="rId2"/>
+          <a:stretch>
+            <a:fillRect/>
+          </a:stretch>
+        </p:blipFill>
+        <p:spPr>
+          <a:xfrm>
+            <a:off x="2052641" y="3086100"/>
+            <a:ext cx="5038714" cy="2367396"/>
+          </a:xfrm>
+          <a:prstGeom prst="rect">
+            <a:avLst/>
+          </a:prstGeom>
+        </p:spPr>
+      </p:pic>
+    </p:spTree>
+    <p:extLst>
+      <p:ext uri="{BB962C8B-B14F-4D97-AF65-F5344CB8AC3E}">
+        <p14:creationId xmlns:p14="http://schemas.microsoft.com/office/powerpoint/2010/main" val="4125033609"/>
+      </p:ext>
+    </p:extLst>
+  </p:cSld>
+  <p:clrMapOvr>
+    <a:masterClrMapping/>
+  </p:clrMapOvr>
+</p:sld>
+</file>
+
+<file path=ppt/slides/slide12.xml><?xml version="1.0" encoding="utf-8"?>
+<p:sld xmlns:a="http://schemas.openxmlformats.org/drawingml/2006/main" xmlns:r="http://schemas.openxmlformats.org/officeDocument/2006/relationships" xmlns:p="http://schemas.openxmlformats.org/presentationml/2006/main">
+  <p:cSld>
+    <p:spTree>
+      <p:nvGrpSpPr>
+        <p:cNvPr id="1" name=""/>
+        <p:cNvGrpSpPr/>
+        <p:nvPr/>
+      </p:nvGrpSpPr>
+      <p:grpSpPr>
+        <a:xfrm>
+          <a:off x="0" y="0"/>
+          <a:ext cx="0" cy="0"/>
+          <a:chOff x="0" y="0"/>
+          <a:chExt cx="0" cy="0"/>
+        </a:xfrm>
+      </p:grpSpPr>
+      <p:sp>
+        <p:nvSpPr>
+          <p:cNvPr id="2" name="Titel 1"/>
+          <p:cNvSpPr>
+            <a:spLocks noGrp="1"/>
+          </p:cNvSpPr>
+          <p:nvPr>
+            <p:ph type="title"/>
+          </p:nvPr>
+        </p:nvSpPr>
+        <p:spPr/>
+        <p:txBody>
+          <a:bodyPr/>
+          <a:lstStyle/>
+          <a:p>
+            <a:r>
+              <a:rPr lang="en-GB" dirty="0"/>
+              <a:t>Technology - Deployment</a:t>
+            </a:r>
+          </a:p>
+        </p:txBody>
+      </p:sp>
+      <p:pic>
+        <p:nvPicPr>
+          <p:cNvPr id="4" name="Inhaltsplatzhalter 3"/>
+          <p:cNvPicPr>
+            <a:picLocks noGrp="1" noChangeAspect="1"/>
+          </p:cNvPicPr>
+          <p:nvPr>
+            <p:ph idx="1"/>
+          </p:nvPr>
+        </p:nvPicPr>
+        <p:blipFill>
+          <a:blip r:embed="rId2"/>
+          <a:stretch>
+            <a:fillRect/>
+          </a:stretch>
+        </p:blipFill>
+        <p:spPr>
+          <a:xfrm>
+            <a:off x="1451514" y="1890699"/>
+            <a:ext cx="6240967" cy="4967301"/>
+          </a:xfrm>
+        </p:spPr>
+      </p:pic>
+    </p:spTree>
+    <p:extLst>
+      <p:ext uri="{BB962C8B-B14F-4D97-AF65-F5344CB8AC3E}">
+        <p14:creationId xmlns:p14="http://schemas.microsoft.com/office/powerpoint/2010/main" val="1834213194"/>
+      </p:ext>
+    </p:extLst>
+  </p:cSld>
+  <p:clrMapOvr>
+    <a:masterClrMapping/>
+  </p:clrMapOvr>
+</p:sld>
+</file>
+
+<file path=ppt/slides/slide13.xml><?xml version="1.0" encoding="utf-8"?>
+<p:sld xmlns:a="http://schemas.openxmlformats.org/drawingml/2006/main" xmlns:r="http://schemas.openxmlformats.org/officeDocument/2006/relationships" xmlns:p="http://schemas.openxmlformats.org/presentationml/2006/main">
+  <p:cSld>
+    <p:spTree>
+      <p:nvGrpSpPr>
+        <p:cNvPr id="1" name=""/>
+        <p:cNvGrpSpPr/>
+        <p:nvPr/>
+      </p:nvGrpSpPr>
+      <p:grpSpPr>
+        <a:xfrm>
+          <a:off x="0" y="0"/>
+          <a:ext cx="0" cy="0"/>
+          <a:chOff x="0" y="0"/>
+          <a:chExt cx="0" cy="0"/>
+        </a:xfrm>
+      </p:grpSpPr>
+      <p:sp>
+        <p:nvSpPr>
+          <p:cNvPr id="2" name="Titel 1"/>
+          <p:cNvSpPr>
+            <a:spLocks noGrp="1"/>
+          </p:cNvSpPr>
+          <p:nvPr>
+            <p:ph type="title"/>
+          </p:nvPr>
+        </p:nvSpPr>
+        <p:spPr/>
+        <p:txBody>
+          <a:bodyPr/>
+          <a:lstStyle/>
+          <a:p>
+            <a:r>
+              <a:rPr lang="en-GB" dirty="0"/>
+              <a:t>Project Management</a:t>
+            </a:r>
+          </a:p>
+        </p:txBody>
+      </p:sp>
+      <p:sp>
+        <p:nvSpPr>
+          <p:cNvPr id="3" name="Inhaltsplatzhalter 2"/>
+          <p:cNvSpPr>
+            <a:spLocks noGrp="1"/>
+          </p:cNvSpPr>
+          <p:nvPr>
+            <p:ph idx="1"/>
+          </p:nvPr>
+        </p:nvSpPr>
+        <p:spPr/>
+        <p:txBody>
+          <a:bodyPr/>
+          <a:lstStyle/>
+          <a:p>
+            <a:r>
+              <a:rPr lang="en-GB" dirty="0"/>
+              <a:t>Jira</a:t>
+            </a:r>
+          </a:p>
+          <a:p>
+            <a:r>
+              <a:rPr lang="en-GB" dirty="0"/>
+              <a:t>Scrumming</a:t>
+            </a:r>
+          </a:p>
+          <a:p>
+            <a:r>
+              <a:rPr lang="en-GB" dirty="0"/>
+              <a:t>Equality</a:t>
+            </a:r>
+          </a:p>
+        </p:txBody>
+      </p:sp>
+    </p:spTree>
+    <p:extLst>
+      <p:ext uri="{BB962C8B-B14F-4D97-AF65-F5344CB8AC3E}">
+        <p14:creationId xmlns:p14="http://schemas.microsoft.com/office/powerpoint/2010/main" val="1595275945"/>
+      </p:ext>
+    </p:extLst>
+  </p:cSld>
+  <p:clrMapOvr>
+    <a:masterClrMapping/>
+  </p:clrMapOvr>
+</p:sld>
+</file>
+
+<file path=ppt/slides/slide14.xml><?xml version="1.0" encoding="utf-8"?>
+<p:sld xmlns:a="http://schemas.openxmlformats.org/drawingml/2006/main" xmlns:r="http://schemas.openxmlformats.org/officeDocument/2006/relationships" xmlns:p="http://schemas.openxmlformats.org/presentationml/2006/main">
+  <p:cSld>
+    <p:spTree>
+      <p:nvGrpSpPr>
+        <p:cNvPr id="1" name=""/>
+        <p:cNvGrpSpPr/>
+        <p:nvPr/>
+      </p:nvGrpSpPr>
+      <p:grpSpPr>
+        <a:xfrm>
+          <a:off x="0" y="0"/>
+          <a:ext cx="0" cy="0"/>
+          <a:chOff x="0" y="0"/>
+          <a:chExt cx="0" cy="0"/>
+        </a:xfrm>
+      </p:grpSpPr>
+      <p:sp>
+        <p:nvSpPr>
+          <p:cNvPr id="2" name="Titel 1"/>
+          <p:cNvSpPr>
+            <a:spLocks noGrp="1"/>
+          </p:cNvSpPr>
+          <p:nvPr>
+            <p:ph type="title"/>
+          </p:nvPr>
+        </p:nvSpPr>
+        <p:spPr/>
+        <p:txBody>
+          <a:bodyPr/>
+          <a:lstStyle/>
+          <a:p>
+            <a:r>
+              <a:rPr lang="en-GB" dirty="0"/>
+              <a:t>PM - Burndown Chart</a:t>
             </a:r>
           </a:p>
         </p:txBody>
@@ -6605,7 +7020,7 @@
 </p:sld>
 </file>
 
-<file path=ppt/slides/slide11.xml><?xml version="1.0" encoding="utf-8"?>
+<file path=ppt/slides/slide15.xml><?xml version="1.0" encoding="utf-8"?>
 <p:sld xmlns:a="http://schemas.openxmlformats.org/drawingml/2006/main" xmlns:r="http://schemas.openxmlformats.org/officeDocument/2006/relationships" xmlns:p="http://schemas.openxmlformats.org/presentationml/2006/main">
   <p:cSld>
     <p:spTree>
@@ -6639,7 +7054,7 @@
           <a:p>
             <a:r>
               <a:rPr lang="en-GB" dirty="0"/>
-              <a:t>Gantt-Chart</a:t>
+              <a:t>PM - Gantt-Chart/Structure</a:t>
             </a:r>
           </a:p>
         </p:txBody>
@@ -6679,7 +7094,7 @@
 </p:sld>
 </file>
 
-<file path=ppt/slides/slide12.xml><?xml version="1.0" encoding="utf-8"?>
+<file path=ppt/slides/slide16.xml><?xml version="1.0" encoding="utf-8"?>
 <p:sld xmlns:a="http://schemas.openxmlformats.org/drawingml/2006/main" xmlns:r="http://schemas.openxmlformats.org/officeDocument/2006/relationships" xmlns:p="http://schemas.openxmlformats.org/presentationml/2006/main">
   <p:cSld>
     <p:spTree>
@@ -6750,7 +7165,7 @@
 </p:sld>
 </file>
 
-<file path=ppt/slides/slide13.xml><?xml version="1.0" encoding="utf-8"?>
+<file path=ppt/slides/slide17.xml><?xml version="1.0" encoding="utf-8"?>
 <p:sld xmlns:a="http://schemas.openxmlformats.org/drawingml/2006/main" xmlns:r="http://schemas.openxmlformats.org/officeDocument/2006/relationships" xmlns:p="http://schemas.openxmlformats.org/presentationml/2006/main">
   <p:cSld>
     <p:spTree>
@@ -6821,77 +7236,6 @@
     <p:extLst>
       <p:ext uri="{BB962C8B-B14F-4D97-AF65-F5344CB8AC3E}">
         <p14:creationId xmlns:p14="http://schemas.microsoft.com/office/powerpoint/2010/main" val="1672159593"/>
-      </p:ext>
-    </p:extLst>
-  </p:cSld>
-  <p:clrMapOvr>
-    <a:masterClrMapping/>
-  </p:clrMapOvr>
-</p:sld>
-</file>
-
-<file path=ppt/slides/slide14.xml><?xml version="1.0" encoding="utf-8"?>
-<p:sld xmlns:a="http://schemas.openxmlformats.org/drawingml/2006/main" xmlns:r="http://schemas.openxmlformats.org/officeDocument/2006/relationships" xmlns:p="http://schemas.openxmlformats.org/presentationml/2006/main">
-  <p:cSld>
-    <p:spTree>
-      <p:nvGrpSpPr>
-        <p:cNvPr id="1" name=""/>
-        <p:cNvGrpSpPr/>
-        <p:nvPr/>
-      </p:nvGrpSpPr>
-      <p:grpSpPr>
-        <a:xfrm>
-          <a:off x="0" y="0"/>
-          <a:ext cx="0" cy="0"/>
-          <a:chOff x="0" y="0"/>
-          <a:chExt cx="0" cy="0"/>
-        </a:xfrm>
-      </p:grpSpPr>
-      <p:sp>
-        <p:nvSpPr>
-          <p:cNvPr id="4" name="Titel 3"/>
-          <p:cNvSpPr>
-            <a:spLocks noGrp="1"/>
-          </p:cNvSpPr>
-          <p:nvPr>
-            <p:ph type="title"/>
-          </p:nvPr>
-        </p:nvSpPr>
-        <p:spPr/>
-        <p:txBody>
-          <a:bodyPr/>
-          <a:lstStyle/>
-          <a:p>
-            <a:r>
-              <a:rPr lang="en-GB" dirty="0"/>
-              <a:t>Thanks for Your Attention</a:t>
-            </a:r>
-          </a:p>
-        </p:txBody>
-      </p:sp>
-      <p:sp>
-        <p:nvSpPr>
-          <p:cNvPr id="5" name="Textplatzhalter 4"/>
-          <p:cNvSpPr>
-            <a:spLocks noGrp="1"/>
-          </p:cNvSpPr>
-          <p:nvPr>
-            <p:ph type="body" idx="1"/>
-          </p:nvPr>
-        </p:nvSpPr>
-        <p:spPr/>
-        <p:txBody>
-          <a:bodyPr/>
-          <a:lstStyle/>
-          <a:p>
-            <a:endParaRPr lang="en-GB"/>
-          </a:p>
-        </p:txBody>
-      </p:sp>
-    </p:spTree>
-    <p:extLst>
-      <p:ext uri="{BB962C8B-B14F-4D97-AF65-F5344CB8AC3E}">
-        <p14:creationId xmlns:p14="http://schemas.microsoft.com/office/powerpoint/2010/main" val="3666593813"/>
       </p:ext>
     </p:extLst>
   </p:cSld>
@@ -6963,7 +7307,7 @@
           <a:p>
             <a:r>
               <a:rPr lang="en-GB" dirty="0"/>
-              <a:t>Idea/Our Vision</a:t>
+              <a:t>Idea + Scope</a:t>
             </a:r>
           </a:p>
           <a:p>
@@ -7061,6 +7405,12 @@
           <a:p>
             <a:r>
               <a:rPr lang="en-GB" dirty="0"/>
+              <a:t>Ritz, Janik</a:t>
+            </a:r>
+          </a:p>
+          <a:p>
+            <a:r>
+              <a:rPr lang="en-GB" dirty="0"/>
               <a:t>Buchwald, Michael</a:t>
             </a:r>
           </a:p>
@@ -7068,12 +7418,6 @@
             <a:r>
               <a:rPr lang="en-GB" dirty="0"/>
               <a:t>Muszynski, Isabell</a:t>
-            </a:r>
-          </a:p>
-          <a:p>
-            <a:r>
-              <a:rPr lang="en-GB" dirty="0"/>
-              <a:t>Ritz, Janik</a:t>
             </a:r>
           </a:p>
           <a:p>
@@ -7131,7 +7475,7 @@
           <a:p>
             <a:r>
               <a:rPr lang="en-GB" dirty="0"/>
-              <a:t>Idea/Vision</a:t>
+              <a:t>Idea</a:t>
             </a:r>
           </a:p>
         </p:txBody>
@@ -7206,15 +7550,40 @@
           <a:chExt cx="0" cy="0"/>
         </a:xfrm>
       </p:grpSpPr>
+      <p:sp>
+        <p:nvSpPr>
+          <p:cNvPr id="2" name="Titel 1"/>
+          <p:cNvSpPr>
+            <a:spLocks noGrp="1"/>
+          </p:cNvSpPr>
+          <p:nvPr>
+            <p:ph type="title"/>
+          </p:nvPr>
+        </p:nvSpPr>
+        <p:spPr/>
+        <p:txBody>
+          <a:bodyPr/>
+          <a:lstStyle/>
+          <a:p>
+            <a:r>
+              <a:rPr lang="en-GB" dirty="0"/>
+              <a:t>Idea - </a:t>
+            </a:r>
+            <a:r>
+              <a:rPr lang="en-GB" dirty="0" err="1"/>
+              <a:t>Mockup</a:t>
+            </a:r>
+            <a:endParaRPr lang="en-GB" dirty="0"/>
+          </a:p>
+        </p:txBody>
+      </p:sp>
       <p:pic>
         <p:nvPicPr>
-          <p:cNvPr id="4" name="Inhaltsplatzhalter 3"/>
+          <p:cNvPr id="3" name="Grafik 2"/>
           <p:cNvPicPr>
-            <a:picLocks noGrp="1" noChangeAspect="1"/>
+            <a:picLocks noChangeAspect="1"/>
           </p:cNvPicPr>
-          <p:nvPr>
-            <p:ph idx="1"/>
-          </p:nvPr>
+          <p:nvPr/>
         </p:nvPicPr>
         <p:blipFill>
           <a:blip r:embed="rId2"/>
@@ -7224,38 +7593,14 @@
         </p:blipFill>
         <p:spPr>
           <a:xfrm>
-            <a:off x="1271940" y="1907913"/>
-            <a:ext cx="6600116" cy="4950087"/>
+            <a:off x="1259029" y="1888546"/>
+            <a:ext cx="6625938" cy="4969454"/>
           </a:xfrm>
+          <a:prstGeom prst="rect">
+            <a:avLst/>
+          </a:prstGeom>
         </p:spPr>
       </p:pic>
-      <p:sp>
-        <p:nvSpPr>
-          <p:cNvPr id="2" name="Titel 1"/>
-          <p:cNvSpPr>
-            <a:spLocks noGrp="1"/>
-          </p:cNvSpPr>
-          <p:nvPr>
-            <p:ph type="title"/>
-          </p:nvPr>
-        </p:nvSpPr>
-        <p:spPr/>
-        <p:txBody>
-          <a:bodyPr/>
-          <a:lstStyle/>
-          <a:p>
-            <a:r>
-              <a:rPr lang="en-GB" dirty="0"/>
-              <a:t>Idea/Vision </a:t>
-            </a:r>
-            <a:r>
-              <a:rPr lang="en-GB" dirty="0" err="1"/>
-              <a:t>Mockup</a:t>
-            </a:r>
-            <a:endParaRPr lang="en-GB" dirty="0"/>
-          </a:p>
-        </p:txBody>
-      </p:sp>
     </p:spTree>
     <p:extLst>
       <p:ext uri="{BB962C8B-B14F-4D97-AF65-F5344CB8AC3E}">
@@ -7270,7 +7615,7 @@
 </file>
 
 <file path=ppt/slides/slide6.xml><?xml version="1.0" encoding="utf-8"?>
-<p:sld xmlns:a="http://schemas.openxmlformats.org/drawingml/2006/main" xmlns:r="http://schemas.openxmlformats.org/officeDocument/2006/relationships" xmlns:p="http://schemas.openxmlformats.org/presentationml/2006/main">
+<p:sld xmlns:a="http://schemas.openxmlformats.org/drawingml/2006/main" xmlns:r="http://schemas.openxmlformats.org/officeDocument/2006/relationships" xmlns:p="http://schemas.openxmlformats.org/presentationml/2006/main" show="0">
   <p:cSld>
     <p:spTree>
       <p:nvGrpSpPr>
@@ -7303,20 +7648,23 @@
           <a:p>
             <a:r>
               <a:rPr lang="en-GB" dirty="0"/>
-              <a:t>Idea/Vision Use-Cases</a:t>
-            </a:r>
+              <a:t>Idea - </a:t>
+            </a:r>
+            <a:r>
+              <a:rPr lang="en-GB" dirty="0" err="1"/>
+              <a:t>Mockup</a:t>
+            </a:r>
+            <a:endParaRPr lang="en-GB" dirty="0"/>
           </a:p>
         </p:txBody>
       </p:sp>
       <p:pic>
         <p:nvPicPr>
-          <p:cNvPr id="4" name="Inhaltsplatzhalter 3"/>
+          <p:cNvPr id="4" name="Grafik 3"/>
           <p:cNvPicPr>
-            <a:picLocks noGrp="1" noChangeAspect="1"/>
+            <a:picLocks noChangeAspect="1"/>
           </p:cNvPicPr>
-          <p:nvPr>
-            <p:ph idx="1"/>
-          </p:nvPr>
+          <p:nvPr/>
         </p:nvPicPr>
         <p:blipFill>
           <a:blip r:embed="rId2"/>
@@ -7326,15 +7674,18 @@
         </p:blipFill>
         <p:spPr>
           <a:xfrm>
-            <a:off x="1447866" y="1893367"/>
-            <a:ext cx="6248264" cy="4964633"/>
+            <a:off x="1259030" y="1888548"/>
+            <a:ext cx="6625936" cy="4969452"/>
           </a:xfrm>
+          <a:prstGeom prst="rect">
+            <a:avLst/>
+          </a:prstGeom>
         </p:spPr>
       </p:pic>
     </p:spTree>
     <p:extLst>
       <p:ext uri="{BB962C8B-B14F-4D97-AF65-F5344CB8AC3E}">
-        <p14:creationId xmlns:p14="http://schemas.microsoft.com/office/powerpoint/2010/main" val="3986482862"/>
+        <p14:creationId xmlns:p14="http://schemas.microsoft.com/office/powerpoint/2010/main" val="2141283615"/>
       </p:ext>
     </p:extLst>
   </p:cSld>
@@ -7378,43 +7729,39 @@
           <a:p>
             <a:r>
               <a:rPr lang="en-GB" dirty="0"/>
-              <a:t>Documents</a:t>
-            </a:r>
-          </a:p>
-        </p:txBody>
-      </p:sp>
-      <p:sp>
-        <p:nvSpPr>
-          <p:cNvPr id="3" name="Inhaltsplatzhalter 2"/>
-          <p:cNvSpPr>
-            <a:spLocks noGrp="1"/>
-          </p:cNvSpPr>
-          <p:nvPr>
-            <p:ph idx="1"/>
-          </p:nvPr>
-        </p:nvSpPr>
-        <p:spPr/>
-        <p:txBody>
-          <a:bodyPr/>
-          <a:lstStyle/>
-          <a:p>
-            <a:r>
-              <a:rPr lang="en-GB" dirty="0"/>
-              <a:t>SRS</a:t>
-            </a:r>
-          </a:p>
-          <a:p>
-            <a:r>
-              <a:rPr lang="en-GB" dirty="0"/>
-              <a:t>SAD</a:t>
-            </a:r>
-          </a:p>
-        </p:txBody>
-      </p:sp>
+              <a:t>Idea - Use-Cases</a:t>
+            </a:r>
+          </a:p>
+        </p:txBody>
+      </p:sp>
+      <p:pic>
+        <p:nvPicPr>
+          <p:cNvPr id="3" name="Grafik 2"/>
+          <p:cNvPicPr>
+            <a:picLocks noChangeAspect="1"/>
+          </p:cNvPicPr>
+          <p:nvPr/>
+        </p:nvPicPr>
+        <p:blipFill>
+          <a:blip r:embed="rId2"/>
+          <a:stretch>
+            <a:fillRect/>
+          </a:stretch>
+        </p:blipFill>
+        <p:spPr>
+          <a:xfrm>
+            <a:off x="1777449" y="1892011"/>
+            <a:ext cx="5589098" cy="4965989"/>
+          </a:xfrm>
+          <a:prstGeom prst="rect">
+            <a:avLst/>
+          </a:prstGeom>
+        </p:spPr>
+      </p:pic>
     </p:spTree>
     <p:extLst>
       <p:ext uri="{BB962C8B-B14F-4D97-AF65-F5344CB8AC3E}">
-        <p14:creationId xmlns:p14="http://schemas.microsoft.com/office/powerpoint/2010/main" val="3430134587"/>
+        <p14:creationId xmlns:p14="http://schemas.microsoft.com/office/powerpoint/2010/main" val="3986482862"/>
       </p:ext>
     </p:extLst>
   </p:cSld>
@@ -7425,7 +7772,7 @@
 </file>
 
 <file path=ppt/slides/slide8.xml><?xml version="1.0" encoding="utf-8"?>
-<p:sld xmlns:a="http://schemas.openxmlformats.org/drawingml/2006/main" xmlns:r="http://schemas.openxmlformats.org/officeDocument/2006/relationships" xmlns:p="http://schemas.openxmlformats.org/presentationml/2006/main">
+<p:sld xmlns:a="http://schemas.openxmlformats.org/drawingml/2006/main" xmlns:r="http://schemas.openxmlformats.org/officeDocument/2006/relationships" xmlns:p="http://schemas.openxmlformats.org/presentationml/2006/main" show="0">
   <p:cSld>
     <p:spTree>
       <p:nvGrpSpPr>
@@ -7458,64 +7805,39 @@
           <a:p>
             <a:r>
               <a:rPr lang="en-GB" dirty="0"/>
-              <a:t>Technology</a:t>
-            </a:r>
-          </a:p>
-        </p:txBody>
-      </p:sp>
-      <p:sp>
-        <p:nvSpPr>
-          <p:cNvPr id="3" name="Inhaltsplatzhalter 2"/>
-          <p:cNvSpPr>
-            <a:spLocks noGrp="1"/>
-          </p:cNvSpPr>
-          <p:nvPr>
-            <p:ph idx="1"/>
-          </p:nvPr>
-        </p:nvSpPr>
-        <p:spPr/>
-        <p:txBody>
-          <a:bodyPr/>
-          <a:lstStyle/>
-          <a:p>
-            <a:r>
-              <a:rPr lang="en-GB" dirty="0"/>
-              <a:t>Java</a:t>
-            </a:r>
-          </a:p>
-          <a:p>
-            <a:r>
-              <a:rPr lang="en-GB" dirty="0"/>
-              <a:t>Spring MVC, Hibernate</a:t>
-            </a:r>
-          </a:p>
-          <a:p>
-            <a:r>
-              <a:rPr lang="en-GB" dirty="0"/>
-              <a:t>SQL </a:t>
-            </a:r>
-            <a:r>
-              <a:rPr lang="en-GB" dirty="0" err="1"/>
-              <a:t>Datenbank</a:t>
-            </a:r>
-            <a:endParaRPr lang="en-GB" dirty="0"/>
-          </a:p>
-          <a:p>
-            <a:r>
-              <a:rPr lang="en-GB" dirty="0" err="1"/>
-              <a:t>Webapp</a:t>
-            </a:r>
-            <a:r>
-              <a:rPr lang="en-GB" dirty="0"/>
-              <a:t>-Runner</a:t>
-            </a:r>
-          </a:p>
-        </p:txBody>
-      </p:sp>
+              <a:t>Idea - Use-Cases</a:t>
+            </a:r>
+          </a:p>
+        </p:txBody>
+      </p:sp>
+      <p:pic>
+        <p:nvPicPr>
+          <p:cNvPr id="4" name="Grafik 3"/>
+          <p:cNvPicPr>
+            <a:picLocks noChangeAspect="1"/>
+          </p:cNvPicPr>
+          <p:nvPr/>
+        </p:nvPicPr>
+        <p:blipFill>
+          <a:blip r:embed="rId2"/>
+          <a:stretch>
+            <a:fillRect/>
+          </a:stretch>
+        </p:blipFill>
+        <p:spPr>
+          <a:xfrm>
+            <a:off x="1437460" y="1876831"/>
+            <a:ext cx="6269076" cy="4981169"/>
+          </a:xfrm>
+          <a:prstGeom prst="rect">
+            <a:avLst/>
+          </a:prstGeom>
+        </p:spPr>
+      </p:pic>
     </p:spTree>
     <p:extLst>
       <p:ext uri="{BB962C8B-B14F-4D97-AF65-F5344CB8AC3E}">
-        <p14:creationId xmlns:p14="http://schemas.microsoft.com/office/powerpoint/2010/main" val="3284099403"/>
+        <p14:creationId xmlns:p14="http://schemas.microsoft.com/office/powerpoint/2010/main" val="118192612"/>
       </p:ext>
     </p:extLst>
   </p:cSld>
@@ -7559,7 +7881,7 @@
           <a:p>
             <a:r>
               <a:rPr lang="en-GB" dirty="0"/>
-              <a:t>Project Management</a:t>
+              <a:t>Technology</a:t>
             </a:r>
           </a:p>
         </p:txBody>
@@ -7581,27 +7903,49 @@
           <a:p>
             <a:r>
               <a:rPr lang="en-GB" dirty="0"/>
-              <a:t>Jira</a:t>
+              <a:t>Java</a:t>
             </a:r>
           </a:p>
           <a:p>
             <a:r>
               <a:rPr lang="en-GB" dirty="0"/>
-              <a:t>Scrumming</a:t>
+              <a:t>Spring MVC, Hibernate</a:t>
             </a:r>
           </a:p>
           <a:p>
             <a:r>
               <a:rPr lang="en-GB" dirty="0"/>
-              <a:t>Equality</a:t>
-            </a:r>
+              <a:t>SQL </a:t>
+            </a:r>
+            <a:r>
+              <a:rPr lang="en-GB" dirty="0" err="1"/>
+              <a:t>Datenbank</a:t>
+            </a:r>
+            <a:endParaRPr lang="en-GB" dirty="0"/>
+          </a:p>
+          <a:p>
+            <a:r>
+              <a:rPr lang="en-GB" dirty="0" err="1"/>
+              <a:t>Webapp</a:t>
+            </a:r>
+            <a:r>
+              <a:rPr lang="en-GB" dirty="0"/>
+              <a:t>-Runner</a:t>
+            </a:r>
+          </a:p>
+          <a:p>
+            <a:r>
+              <a:rPr lang="en-GB" dirty="0" err="1"/>
+              <a:t>Github</a:t>
+            </a:r>
+            <a:endParaRPr lang="en-GB" dirty="0"/>
           </a:p>
         </p:txBody>
       </p:sp>
     </p:spTree>
     <p:extLst>
       <p:ext uri="{BB962C8B-B14F-4D97-AF65-F5344CB8AC3E}">
-        <p14:creationId xmlns:p14="http://schemas.microsoft.com/office/powerpoint/2010/main" val="1595275945"/>
+        <p14:creationId xmlns:p14="http://schemas.microsoft.com/office/powerpoint/2010/main" val="3284099403"/>
       </p:ext>
     </p:extLst>
   </p:cSld>

</xml_diff>